<commit_message>
Finish wireless network paper ppt
</commit_message>
<xml_diff>
--- a/wireless_network/PaperReading/Report.pptx
+++ b/wireless_network/PaperReading/Report.pptx
@@ -10152,7 +10152,7 @@
           <a:p>
             <a:fld id="{90AE32B7-19C5-4095-9C95-F277E30D1456}" type="datetimeFigureOut">
               <a:rPr lang="zh-TW" altLang="en-US" smtClean="0"/>
-              <a:t>2019/12/29</a:t>
+              <a:t>2019/12/30</a:t>
             </a:fld>
             <a:endParaRPr lang="zh-TW" altLang="en-US"/>
           </a:p>
@@ -10635,7 +10635,7 @@
           <a:p>
             <a:fld id="{D0C519A4-C899-4FE3-B2C0-EA32C1E2A373}" type="datetime1">
               <a:rPr lang="zh-TW" altLang="en-US" smtClean="0"/>
-              <a:t>2019/12/29</a:t>
+              <a:t>2019/12/30</a:t>
             </a:fld>
             <a:endParaRPr lang="zh-TW" altLang="en-US"/>
           </a:p>
@@ -10805,7 +10805,7 @@
           <a:p>
             <a:fld id="{AAF725E2-3DF1-496F-923B-ADC93C1FF91E}" type="datetime1">
               <a:rPr lang="zh-TW" altLang="en-US" smtClean="0"/>
-              <a:t>2019/12/29</a:t>
+              <a:t>2019/12/30</a:t>
             </a:fld>
             <a:endParaRPr lang="zh-TW" altLang="en-US"/>
           </a:p>
@@ -10985,7 +10985,7 @@
           <a:p>
             <a:fld id="{BA639709-0C54-4055-B8A5-334E3C574642}" type="datetime1">
               <a:rPr lang="zh-TW" altLang="en-US" smtClean="0"/>
-              <a:t>2019/12/29</a:t>
+              <a:t>2019/12/30</a:t>
             </a:fld>
             <a:endParaRPr lang="zh-TW" altLang="en-US"/>
           </a:p>
@@ -11155,7 +11155,7 @@
           <a:p>
             <a:fld id="{529E66E2-A720-4114-9EAD-35F33426C266}" type="datetime1">
               <a:rPr lang="zh-TW" altLang="en-US" smtClean="0"/>
-              <a:t>2019/12/29</a:t>
+              <a:t>2019/12/30</a:t>
             </a:fld>
             <a:endParaRPr lang="zh-TW" altLang="en-US"/>
           </a:p>
@@ -11401,7 +11401,7 @@
           <a:p>
             <a:fld id="{EC6CA15E-6041-4E19-A88F-713A849FAB1F}" type="datetime1">
               <a:rPr lang="zh-TW" altLang="en-US" smtClean="0"/>
-              <a:t>2019/12/29</a:t>
+              <a:t>2019/12/30</a:t>
             </a:fld>
             <a:endParaRPr lang="zh-TW" altLang="en-US"/>
           </a:p>
@@ -11633,7 +11633,7 @@
           <a:p>
             <a:fld id="{ED1B1673-2459-4015-8514-10CC325F640F}" type="datetime1">
               <a:rPr lang="zh-TW" altLang="en-US" smtClean="0"/>
-              <a:t>2019/12/29</a:t>
+              <a:t>2019/12/30</a:t>
             </a:fld>
             <a:endParaRPr lang="zh-TW" altLang="en-US"/>
           </a:p>
@@ -12000,7 +12000,7 @@
           <a:p>
             <a:fld id="{14BBF4F7-C57C-4105-9534-84A0BF80F02F}" type="datetime1">
               <a:rPr lang="zh-TW" altLang="en-US" smtClean="0"/>
-              <a:t>2019/12/29</a:t>
+              <a:t>2019/12/30</a:t>
             </a:fld>
             <a:endParaRPr lang="zh-TW" altLang="en-US"/>
           </a:p>
@@ -12118,7 +12118,7 @@
           <a:p>
             <a:fld id="{973340D1-97F9-4595-91A4-880B1C854E40}" type="datetime1">
               <a:rPr lang="zh-TW" altLang="en-US" smtClean="0"/>
-              <a:t>2019/12/29</a:t>
+              <a:t>2019/12/30</a:t>
             </a:fld>
             <a:endParaRPr lang="zh-TW" altLang="en-US"/>
           </a:p>
@@ -12213,7 +12213,7 @@
           <a:p>
             <a:fld id="{017D0E3B-C414-4A74-9F90-82C22692D280}" type="datetime1">
               <a:rPr lang="zh-TW" altLang="en-US" smtClean="0"/>
-              <a:t>2019/12/29</a:t>
+              <a:t>2019/12/30</a:t>
             </a:fld>
             <a:endParaRPr lang="zh-TW" altLang="en-US"/>
           </a:p>
@@ -12490,7 +12490,7 @@
           <a:p>
             <a:fld id="{2C132A8D-7E8C-45E9-AF19-479C7BF98E21}" type="datetime1">
               <a:rPr lang="zh-TW" altLang="en-US" smtClean="0"/>
-              <a:t>2019/12/29</a:t>
+              <a:t>2019/12/30</a:t>
             </a:fld>
             <a:endParaRPr lang="zh-TW" altLang="en-US"/>
           </a:p>
@@ -12743,7 +12743,7 @@
           <a:p>
             <a:fld id="{E5E4FAB2-8603-4182-B607-B8D4C5ACF843}" type="datetime1">
               <a:rPr lang="zh-TW" altLang="en-US" smtClean="0"/>
-              <a:t>2019/12/29</a:t>
+              <a:t>2019/12/30</a:t>
             </a:fld>
             <a:endParaRPr lang="zh-TW" altLang="en-US"/>
           </a:p>
@@ -12956,7 +12956,7 @@
           <a:p>
             <a:fld id="{01AA6340-B1F5-49D0-BCE2-BF206B87664B}" type="datetime1">
               <a:rPr lang="zh-TW" altLang="en-US" smtClean="0"/>
-              <a:t>2019/12/29</a:t>
+              <a:t>2019/12/30</a:t>
             </a:fld>
             <a:endParaRPr lang="zh-TW" altLang="en-US"/>
           </a:p>
@@ -14462,51 +14462,6 @@
                                           </p:stCondLst>
                                         </p:cTn>
                                         <p:tgtEl>
-                                          <p:spTgt spid="8"/>
-                                        </p:tgtEl>
-                                        <p:attrNameLst>
-                                          <p:attrName>style.visibility</p:attrName>
-                                        </p:attrNameLst>
-                                      </p:cBhvr>
-                                      <p:to>
-                                        <p:strVal val="visible"/>
-                                      </p:to>
-                                    </p:set>
-                                  </p:childTnLst>
-                                </p:cTn>
-                              </p:par>
-                            </p:childTnLst>
-                          </p:cTn>
-                        </p:par>
-                      </p:childTnLst>
-                    </p:cTn>
-                  </p:par>
-                  <p:par>
-                    <p:cTn id="7" fill="hold">
-                      <p:stCondLst>
-                        <p:cond delay="indefinite"/>
-                      </p:stCondLst>
-                      <p:childTnLst>
-                        <p:par>
-                          <p:cTn id="8" fill="hold">
-                            <p:stCondLst>
-                              <p:cond delay="0"/>
-                            </p:stCondLst>
-                            <p:childTnLst>
-                              <p:par>
-                                <p:cTn id="9" presetID="1" presetClass="entr" presetSubtype="0" fill="hold" grpId="0" nodeType="clickEffect">
-                                  <p:stCondLst>
-                                    <p:cond delay="0"/>
-                                  </p:stCondLst>
-                                  <p:childTnLst>
-                                    <p:set>
-                                      <p:cBhvr>
-                                        <p:cTn id="10" dur="1" fill="hold">
-                                          <p:stCondLst>
-                                            <p:cond delay="0"/>
-                                          </p:stCondLst>
-                                        </p:cTn>
-                                        <p:tgtEl>
                                           <p:spTgt spid="13"/>
                                         </p:tgtEl>
                                         <p:attrNameLst>
@@ -14521,14 +14476,14 @@
                                 </p:cTn>
                               </p:par>
                               <p:par>
-                                <p:cTn id="11" presetID="0" presetClass="path" presetSubtype="0" accel="50000" decel="50000" fill="hold" nodeType="withEffect">
+                                <p:cTn id="7" presetID="0" presetClass="path" presetSubtype="0" accel="50000" decel="50000" fill="hold" nodeType="withEffect">
                                   <p:stCondLst>
                                     <p:cond delay="0"/>
                                   </p:stCondLst>
                                   <p:childTnLst>
                                     <p:animMotion origin="layout" path="M 2.08333E-7 -7.40741E-7 L 2.08333E-7 0.00023 C 0.00195 -0.00208 0.00378 -0.00463 0.00573 -0.00648 C 0.0069 -0.00741 0.00807 -0.00764 0.00937 -0.00764 C 0.01523 -0.00764 0.02122 -0.00694 0.02721 -0.00648 C 0.02773 -0.00555 0.02812 -0.00463 0.02865 -0.00393 C 0.0293 -0.00301 0.03021 -0.00255 0.03073 -0.00139 C 0.03125 -0.00023 0.03112 0.00139 0.03151 0.00255 C 0.03177 0.00347 0.03242 0.00417 0.03294 0.00509 C 0.03372 0.01042 0.03437 0.01435 0.03437 0.02037 C 0.03437 0.02361 0.03411 0.02708 0.03359 0.03032 C 0.03307 0.03403 0.0293 0.03889 0.02786 0.03935 C 0.02539 0.04028 0.02383 0.04074 0.02148 0.0419 C 0.0207 0.04213 0.02005 0.04306 0.01927 0.04306 C 0.01224 0.04398 0.00508 0.04398 -0.00208 0.04445 C -0.00326 0.04468 -0.01315 0.0463 -0.01497 0.04699 C -0.01641 0.04745 -0.01784 0.04861 -0.01927 0.04954 L -0.02135 0.0507 L -0.02565 0.05579 C -0.02643 0.05671 -0.02721 0.05718 -0.02786 0.05833 L -0.02995 0.06227 C -0.02969 0.06644 -0.03008 0.07083 -0.0293 0.075 C -0.02865 0.07778 -0.02656 0.0787 -0.02565 0.08125 C -0.02279 0.08889 -0.02591 0.08171 -0.02214 0.0875 C -0.02083 0.08958 -0.01992 0.09213 -0.01849 0.09398 C -0.01628 0.09699 -0.01536 0.09861 -0.01276 0.10023 C -0.01185 0.10093 -0.01094 0.10116 -0.0099 0.10162 C -0.00586 0.10648 -0.0099 0.10255 -0.00286 0.10532 C -0.0013 0.10602 2.08333E-7 0.10787 0.00143 0.10787 L 0.0151 0.10926 C 0.01576 0.10949 0.01641 0.11019 0.01719 0.11042 C 0.01836 0.11088 0.01953 0.11134 0.0207 0.11181 C 0.02174 0.11204 0.02266 0.1125 0.02357 0.11296 C 0.02461 0.11389 0.02552 0.11458 0.02643 0.11551 C 0.02799 0.11713 0.03073 0.1206 0.03073 0.12083 C 0.03151 0.12245 0.03294 0.1257 0.03294 0.12824 C 0.03294 0.13287 0.03268 0.13773 0.03216 0.14213 C 0.03203 0.14375 0.03138 0.14491 0.03073 0.14607 C 0.03047 0.14653 0.02656 0.15162 0.02578 0.15232 C 0.02513 0.15301 0.02435 0.15324 0.02357 0.1537 C 0.02318 0.1544 0.02279 0.15556 0.02214 0.15625 C 0.02135 0.15695 0.02031 0.15695 0.01927 0.15741 C 0.01862 0.15787 0.01784 0.15833 0.01719 0.1588 C 0.01172 0.1625 0.01549 0.16065 0.00937 0.1625 C 0.00833 0.16343 0.00742 0.16435 0.00651 0.16505 C 0.00482 0.1662 0.00078 0.16713 -0.00065 0.16759 C -0.00378 0.16713 -0.0069 0.16713 -0.0099 0.16644 C -0.01146 0.16597 -0.01276 0.16458 -0.01419 0.16389 C -0.01719 0.16204 -0.01576 0.1632 -0.01849 0.15995 C -0.02266 0.15023 -0.01862 0.15857 -0.02279 0.15232 C -0.02826 0.14421 -0.02174 0.15232 -0.02708 0.14607 C -0.02839 0.13935 -0.02734 0.14329 -0.03073 0.13449 L -0.03216 0.13079 C -0.03372 0.12199 -0.03177 0.13287 -0.03359 0.1206 C -0.03372 0.11921 -0.03398 0.11806 -0.03424 0.1169 C -0.03477 0.11366 -0.0349 0.11088 -0.03568 0.10787 C -0.03607 0.10625 -0.03659 0.10463 -0.03711 0.10278 C -0.03737 0.10116 -0.03737 0.09931 -0.03776 0.09769 C -0.03841 0.09583 -0.03958 0.09468 -0.03997 0.09259 C -0.04063 0.08935 -0.04049 0.08588 -0.04063 0.08241 C -0.04049 0.06945 -0.04049 0.05625 -0.03997 0.04306 C -0.03971 0.0375 -0.03776 0.0338 -0.03633 0.02917 C -0.03581 0.02755 -0.03555 0.0257 -0.0349 0.02407 C -0.03438 0.02269 -0.03346 0.02176 -0.03281 0.02037 C -0.03177 0.01782 -0.03112 0.01482 -0.02995 0.01273 C -0.0293 0.01134 -0.02852 0.01019 -0.02786 0.0088 C -0.02721 0.00764 -0.02708 0.00602 -0.02643 0.00509 C -0.02578 0.00417 -0.02487 0.0044 -0.02422 0.0037 C -0.02344 0.00301 -0.02279 0.00185 -0.02214 0.00116 C -0.02122 0.00023 -0.02018 -0.00046 -0.01927 -0.00139 C -0.01771 -0.00301 -0.01654 -0.00555 -0.01497 -0.00648 C -0.01354 -0.00718 -0.01211 -0.00833 -0.01068 -0.00903 C -0.00977 -0.00949 -0.00872 -0.00972 -0.00781 -0.01018 C -0.00638 -0.01111 -0.00495 -0.01227 -0.00352 -0.01273 C -0.00234 -0.01319 -0.00117 -0.01343 2.08333E-7 -0.01412 C 0.00078 -0.01435 0.00143 -0.01505 0.00221 -0.01528 C 0.00404 -0.0162 0.00612 -0.0162 0.00794 -0.01782 C 0.00885 -0.01875 0.00977 -0.01991 0.01081 -0.02037 C 0.01211 -0.02106 0.01367 -0.0213 0.0151 -0.02176 C 0.01576 -0.02199 0.01641 -0.02292 0.01719 -0.02292 C 0.02057 -0.02292 0.02383 -0.02245 0.02721 -0.02176 C 0.02799 -0.02153 0.02865 -0.0206 0.0293 -0.02037 C 0.03047 -0.01991 0.03177 -0.01944 0.03294 -0.01921 C 0.03385 -0.01829 0.03477 -0.01736 0.03581 -0.01667 C 0.03646 -0.01597 0.03724 -0.01597 0.03789 -0.01528 C 0.04284 -0.01018 0.03542 -0.01505 0.04154 -0.01157 C 0.04219 -0.01018 0.04284 -0.0088 0.04362 -0.00764 C 0.04453 -0.00648 0.0457 -0.00648 0.04648 -0.00509 C 0.04792 -0.00278 0.04818 0.00208 0.04857 0.00509 C 0.04909 0.00764 0.04974 0.00995 0.05 0.01273 C 0.05026 0.01435 0.05052 0.01597 0.05078 0.01782 C 0.05104 0.01898 0.0513 0.02014 0.05143 0.02153 C 0.05182 0.02361 0.05169 0.02593 0.05221 0.02778 C 0.05286 0.03056 0.05508 0.03542 0.05508 0.03565 C 0.05664 0.04653 0.05469 0.03449 0.05716 0.0456 C 0.0582 0.05 0.05937 0.05787 0.06003 0.06227 C 0.05977 0.07523 0.06003 0.08843 0.05937 0.10162 C 0.05924 0.10347 0.05833 0.10486 0.05794 0.10671 C 0.05768 0.10787 0.05742 0.10926 0.05716 0.11042 C 0.0569 0.11204 0.05677 0.11389 0.05651 0.11551 C 0.05625 0.1169 0.05599 0.11806 0.05573 0.11945 C 0.05547 0.12107 0.05534 0.12269 0.05508 0.12454 C 0.05482 0.1257 0.05456 0.12685 0.0543 0.12824 C 0.05404 0.13032 0.05404 0.13264 0.05365 0.13449 C 0.05312 0.13727 0.05169 0.14097 0.05078 0.14352 C 0.05013 0.14514 0.04948 0.14722 0.04857 0.14861 C 0.04779 0.14977 0.04661 0.15 0.04583 0.15116 C 0.04479 0.15232 0.04401 0.15394 0.04297 0.15486 C 0.04206 0.15579 0.04102 0.15556 0.0401 0.15625 C 0.03763 0.1581 0.03555 0.16181 0.03294 0.1625 C 0.03151 0.16296 0.03008 0.1632 0.02865 0.16389 C 0.02721 0.16435 0.02578 0.16574 0.02435 0.16644 C 0.02122 0.16759 0.0181 0.16806 0.0151 0.16898 C 0.01315 0.17014 0.01133 0.17176 0.00937 0.17269 C 0.00768 0.17361 0.00039 0.175 -0.00065 0.17523 C -0.00703 0.17801 -0.00013 0.17523 -0.01133 0.17778 C -0.01263 0.17801 -0.0138 0.1787 -0.01497 0.17917 L -0.0293 0.17778 C -0.03021 0.17732 -0.02956 0.17431 -0.02995 0.17269 C -0.03034 0.17107 -0.0332 0.16482 -0.03359 0.16389 C -0.03724 0.15324 -0.0332 0.16366 -0.03568 0.15486 C -0.03607 0.15347 -0.03659 0.15232 -0.03711 0.15116 C -0.03867 0.14722 -0.04206 0.13958 -0.04206 0.13982 C -0.04349 0.13333 -0.04505 0.12616 -0.04714 0.1206 L -0.04857 0.1169 C -0.04961 0.11088 -0.05026 0.1088 -0.05065 0.10278 C -0.05299 0.07222 -0.05013 0.10347 -0.05208 0.08241 C -0.05182 0.06644 -0.05182 0.05023 -0.05143 0.03426 C -0.0513 0.03241 -0.05104 0.03079 -0.05065 0.02917 C -0.05026 0.02732 -0.04974 0.0257 -0.04922 0.02407 C -0.04896 0.02153 -0.04896 0.01898 -0.04857 0.01644 C -0.04753 0.01111 -0.04414 0.00208 -0.04206 -0.00139 C -0.04167 -0.00208 -0.04115 -0.00301 -0.04063 -0.00393 C -0.03997 -0.00555 -0.03932 -0.00741 -0.03854 -0.00903 C -0.03659 -0.0125 -0.03294 -0.01643 -0.03073 -0.01921 L -0.02852 -0.02176 C -0.02786 -0.02245 -0.02721 -0.02384 -0.02643 -0.0243 L -0.02135 -0.02685 C -0.0207 -0.02708 -0.01992 -0.02778 -0.01927 -0.02801 C -0.0181 -0.02847 -0.0168 -0.02893 -0.01563 -0.02917 C -0.00521 -0.02847 0.00534 -0.02824 0.01576 -0.02685 C 0.02917 -0.02477 0.01654 -0.02593 0.02214 -0.02176 C 0.02331 -0.02083 0.02461 -0.02083 0.02578 -0.02037 C 0.02721 -0.01875 0.02852 -0.0169 0.03008 -0.01528 C 0.03607 -0.00949 0.02734 -0.02639 0.03932 -0.00509 C 0.04049 -0.00301 0.04167 -0.00069 0.04297 0.00116 C 0.04362 0.00232 0.0444 0.00278 0.04505 0.0037 C 0.04596 0.00486 0.04701 0.00625 0.04792 0.00764 C 0.04818 0.0088 0.04818 0.01019 0.04857 0.01134 C 0.04987 0.01505 0.05286 0.02153 0.05286 0.02176 C 0.05312 0.02292 0.05339 0.02407 0.05365 0.02523 C 0.05469 0.02986 0.05508 0.03032 0.05651 0.03426 C 0.05677 0.03681 0.0569 0.03935 0.05716 0.0419 C 0.05872 0.05417 0.05703 0.03565 0.05859 0.0507 C 0.05898 0.0537 0.05911 0.05671 0.05937 0.05972 C 0.05911 0.06759 0.05951 0.07593 0.05859 0.0838 C 0.05781 0.09097 0.05599 0.09051 0.05365 0.09398 C 0.05286 0.09514 0.05208 0.0963 0.05143 0.09769 C 0.05091 0.09884 0.05065 0.10046 0.05 0.10162 C 0.04831 0.1044 0.04583 0.10579 0.0444 0.10926 C 0.04362 0.11088 0.0431 0.11273 0.04219 0.11435 C 0.04206 0.11458 0.0362 0.12245 0.03437 0.12454 C 0.03346 0.12546 0.03242 0.12639 0.03151 0.12685 C 0.02982 0.12801 0.02812 0.1287 0.02643 0.1294 C 0.02578 0.12986 0.025 0.13032 0.02435 0.13079 C 0.02331 0.13148 0.02253 0.13264 0.02148 0.13333 C 0.01536 0.13773 0.01927 0.13449 0.01367 0.13704 C 0.00495 0.1412 0.01393 0.13843 0.0043 0.14097 C -0.00052 0.14375 0.00534 0.14051 -0.00286 0.14352 C -0.00352 0.14375 -0.0043 0.14421 -0.00495 0.14468 C -0.01016 0.14421 -0.01549 0.14468 -0.0207 0.14352 C -0.02148 0.14329 -0.02201 0.14167 -0.02279 0.14097 C -0.02813 0.13681 -0.02578 0.14028 -0.02995 0.13588 C -0.03138 0.13426 -0.03281 0.13241 -0.03424 0.13079 C -0.03542 0.1294 -0.03672 0.12824 -0.03776 0.12685 C -0.0474 0.11551 -0.0418 0.12083 -0.04779 0.11551 C -0.04831 0.11435 -0.0487 0.11296 -0.04922 0.11181 C -0.05443 0.10116 -0.04987 0.11273 -0.05495 0.10023 C -0.05599 0.09792 -0.05729 0.0956 -0.05781 0.09259 C -0.06029 0.07986 -0.05651 0.09977 -0.05924 0.0838 C -0.06185 0.06829 -0.05977 0.08287 -0.06133 0.07107 C -0.06094 0.06296 -0.06081 0.05486 -0.06003 0.04699 C -0.05977 0.04491 -0.05703 0.04028 -0.05638 0.03935 C -0.05573 0.03843 -0.05495 0.0375 -0.0543 0.03681 C -0.04857 0.03125 -0.04857 0.03218 -0.04063 0.02917 C -0.03919 0.0287 -0.03776 0.02824 -0.03633 0.02778 L 0.00365 0.02917 C 0.00456 0.02917 0.00547 0.03009 0.00651 0.03032 C 0.0082 0.03102 0.0112 0.03195 0.01289 0.03287 C 0.02031 0.03727 0.01341 0.03333 0.01862 0.03796 C 0.01927 0.03866 0.02005 0.03889 0.0207 0.03935 C 0.02174 0.04097 0.02253 0.04306 0.02357 0.04445 C 0.02448 0.0456 0.02565 0.04583 0.02643 0.04699 C 0.02708 0.04792 0.02734 0.04954 0.02786 0.0507 C 0.02839 0.05162 0.02878 0.05255 0.0293 0.05324 C 0.02995 0.05417 0.03086 0.05486 0.03151 0.05579 C 0.03255 0.05741 0.03333 0.05926 0.03437 0.06088 L 0.0401 0.07107 L 0.04505 0.07986 C 0.04622 0.08171 0.04857 0.08472 0.05 0.08634 C 0.05104 0.08727 0.05208 0.08773 0.05286 0.08889 C 0.05352 0.08958 0.05378 0.09074 0.0543 0.09144 C 0.05573 0.09282 0.05977 0.09352 0.06081 0.09398 C 0.06146 0.09421 0.06224 0.09468 0.06289 0.09514 C 0.06406 0.09491 0.0694 0.09468 0.07148 0.09259 C 0.07305 0.0912 0.07578 0.0875 0.07578 0.08773 C 0.07604 0.08634 0.07656 0.08519 0.07643 0.0838 C 0.07604 0.07732 0.07552 0.07708 0.07357 0.07361 L 0.07292 0.06991 " pathEditMode="relative" rAng="0" ptsTypes="AAAAAAAAAAAAAAAAAAAAAAAAAAAAAAAAAAAAAAAAAAAAAAAAAAAAAAAAAAAAAAAAAAAAAAAAAAAAAAAAAAAAAAAAAAAAAAAAAAAAAAAAAAAAAAAAAAAAAAAAAAAAAAAAAAAAAAAAAAAAAAAAAAAAAAAAAAAAAAAAAAAAAAAAAAAAAAAAAAAAAAAAAAAAAAAAAAAAAAAAAAAAAAAAA">
                                       <p:cBhvr>
-                                        <p:cTn id="12" dur="5000" fill="hold"/>
+                                        <p:cTn id="8" dur="5000" fill="hold"/>
                                         <p:tgtEl>
                                           <p:spTgt spid="7"/>
                                         </p:tgtEl>
@@ -14549,26 +14504,26 @@
                     </p:cTn>
                   </p:par>
                   <p:par>
-                    <p:cTn id="13" fill="hold">
+                    <p:cTn id="9" fill="hold">
                       <p:stCondLst>
                         <p:cond delay="indefinite"/>
                       </p:stCondLst>
                       <p:childTnLst>
                         <p:par>
-                          <p:cTn id="14" fill="hold">
+                          <p:cTn id="10" fill="hold">
                             <p:stCondLst>
                               <p:cond delay="0"/>
                             </p:stCondLst>
                             <p:childTnLst>
                               <p:par>
-                                <p:cTn id="15" presetID="1" presetClass="entr" presetSubtype="0" fill="hold" grpId="0" nodeType="clickEffect">
+                                <p:cTn id="11" presetID="1" presetClass="entr" presetSubtype="0" fill="hold" grpId="0" nodeType="clickEffect">
                                   <p:stCondLst>
                                     <p:cond delay="0"/>
                                   </p:stCondLst>
                                   <p:childTnLst>
                                     <p:set>
                                       <p:cBhvr>
-                                        <p:cTn id="16" dur="1" fill="hold">
+                                        <p:cTn id="12" dur="1" fill="hold">
                                           <p:stCondLst>
                                             <p:cond delay="0"/>
                                           </p:stCondLst>
@@ -14588,14 +14543,14 @@
                                 </p:cTn>
                               </p:par>
                               <p:par>
-                                <p:cTn id="17" presetID="1" presetClass="entr" presetSubtype="0" fill="hold" grpId="0" nodeType="withEffect">
+                                <p:cTn id="13" presetID="1" presetClass="entr" presetSubtype="0" fill="hold" grpId="0" nodeType="withEffect">
                                   <p:stCondLst>
                                     <p:cond delay="0"/>
                                   </p:stCondLst>
                                   <p:childTnLst>
                                     <p:set>
                                       <p:cBhvr>
-                                        <p:cTn id="18" dur="1" fill="hold">
+                                        <p:cTn id="14" dur="1" fill="hold">
                                           <p:stCondLst>
                                             <p:cond delay="0"/>
                                           </p:stCondLst>
@@ -14615,14 +14570,14 @@
                                 </p:cTn>
                               </p:par>
                               <p:par>
-                                <p:cTn id="19" presetID="1" presetClass="entr" presetSubtype="0" fill="hold" nodeType="withEffect">
+                                <p:cTn id="15" presetID="1" presetClass="entr" presetSubtype="0" fill="hold" nodeType="withEffect">
                                   <p:stCondLst>
                                     <p:cond delay="0"/>
                                   </p:stCondLst>
                                   <p:childTnLst>
                                     <p:set>
                                       <p:cBhvr>
-                                        <p:cTn id="20" dur="1" fill="hold">
+                                        <p:cTn id="16" dur="1" fill="hold">
                                           <p:stCondLst>
                                             <p:cond delay="0"/>
                                           </p:stCondLst>
@@ -14669,7 +14624,6 @@
       </p:par>
     </p:tnLst>
     <p:bldLst>
-      <p:bldP spid="8" grpId="0"/>
       <p:bldP spid="13" grpId="0"/>
       <p:bldP spid="14" grpId="0"/>
       <p:bldP spid="15" grpId="0"/>
@@ -16244,8 +16198,8 @@
           </p:sp>
         </mc:Fallback>
       </mc:AlternateContent>
-      <mc:AlternateContent xmlns:mc="http://schemas.openxmlformats.org/markup-compatibility/2006">
-        <mc:Choice xmlns:a14="http://schemas.microsoft.com/office/drawing/2010/main" Requires="a14">
+      <mc:AlternateContent xmlns:mc="http://schemas.openxmlformats.org/markup-compatibility/2006" xmlns:a14="http://schemas.microsoft.com/office/drawing/2010/main">
+        <mc:Choice Requires="a14">
           <p:sp>
             <p:nvSpPr>
               <p:cNvPr id="2" name="文字方塊 1"/>
@@ -16326,7 +16280,7 @@
             </p:txBody>
           </p:sp>
         </mc:Choice>
-        <mc:Fallback>
+        <mc:Fallback xmlns="">
           <p:sp>
             <p:nvSpPr>
               <p:cNvPr id="2" name="文字方塊 1"/>
@@ -21343,14 +21297,7 @@
                 <a:latin typeface="Times New Roman" panose="02020603050405020304" pitchFamily="18" charset="0"/>
                 <a:cs typeface="Times New Roman" panose="02020603050405020304" pitchFamily="18" charset="0"/>
               </a:rPr>
-              <a:t>UAVs Traffic Management </a:t>
-            </a:r>
-            <a:r>
-              <a:rPr lang="en-US" altLang="zh-TW" b="1" dirty="0" smtClean="0">
-                <a:latin typeface="Times New Roman" panose="02020603050405020304" pitchFamily="18" charset="0"/>
-                <a:cs typeface="Times New Roman" panose="02020603050405020304" pitchFamily="18" charset="0"/>
-              </a:rPr>
-              <a:t>Service</a:t>
+              <a:t>UAVs Traffic Management Service</a:t>
             </a:r>
             <a:r>
               <a:rPr lang="zh-TW" altLang="en-US" b="1" dirty="0" smtClean="0">
@@ -21364,19 +21311,8 @@
                 <a:latin typeface="Times New Roman" panose="02020603050405020304" pitchFamily="18" charset="0"/>
                 <a:cs typeface="Times New Roman" panose="02020603050405020304" pitchFamily="18" charset="0"/>
               </a:rPr>
-              <a:t>(UTMS) </a:t>
+              <a:t>(UTMS) : </a:t>
             </a:r>
-            <a:r>
-              <a:rPr lang="en-US" altLang="zh-TW" b="1" dirty="0" smtClean="0">
-                <a:latin typeface="Times New Roman" panose="02020603050405020304" pitchFamily="18" charset="0"/>
-                <a:cs typeface="Times New Roman" panose="02020603050405020304" pitchFamily="18" charset="0"/>
-              </a:rPr>
-              <a:t>: </a:t>
-            </a:r>
-            <a:endParaRPr lang="en-US" altLang="zh-TW" b="1" dirty="0" smtClean="0">
-              <a:latin typeface="Times New Roman" panose="02020603050405020304" pitchFamily="18" charset="0"/>
-              <a:cs typeface="Times New Roman" panose="02020603050405020304" pitchFamily="18" charset="0"/>
-            </a:endParaRPr>
           </a:p>
           <a:p>
             <a:pPr lvl="1" algn="just"/>
@@ -21440,14 +21376,7 @@
                 <a:latin typeface="Times New Roman" panose="02020603050405020304" pitchFamily="18" charset="0"/>
                 <a:cs typeface="Times New Roman" panose="02020603050405020304" pitchFamily="18" charset="0"/>
               </a:rPr>
-              <a:t>Supplementary Data Provider </a:t>
-            </a:r>
-            <a:r>
-              <a:rPr lang="en-US" altLang="zh-TW" b="1" dirty="0" smtClean="0">
-                <a:latin typeface="Times New Roman" panose="02020603050405020304" pitchFamily="18" charset="0"/>
-                <a:cs typeface="Times New Roman" panose="02020603050405020304" pitchFamily="18" charset="0"/>
-              </a:rPr>
-              <a:t>Service (SDPS) : </a:t>
+              <a:t>Supplementary Data Provider Service (SDPS) : </a:t>
             </a:r>
           </a:p>
           <a:p>
@@ -21484,26 +21413,8 @@
                 <a:latin typeface="Times New Roman" panose="02020603050405020304" pitchFamily="18" charset="0"/>
                 <a:cs typeface="Times New Roman" panose="02020603050405020304" pitchFamily="18" charset="0"/>
               </a:rPr>
-              <a:t>Operator Command and Control </a:t>
+              <a:t>Operator Command and Control Service (OCCS) : </a:t>
             </a:r>
-            <a:r>
-              <a:rPr lang="en-US" altLang="zh-TW" b="1" dirty="0" smtClean="0">
-                <a:latin typeface="Times New Roman" panose="02020603050405020304" pitchFamily="18" charset="0"/>
-                <a:cs typeface="Times New Roman" panose="02020603050405020304" pitchFamily="18" charset="0"/>
-              </a:rPr>
-              <a:t>Service (OCCS) </a:t>
-            </a:r>
-            <a:r>
-              <a:rPr lang="en-US" altLang="zh-TW" b="1" dirty="0" smtClean="0">
-                <a:latin typeface="Times New Roman" panose="02020603050405020304" pitchFamily="18" charset="0"/>
-                <a:cs typeface="Times New Roman" panose="02020603050405020304" pitchFamily="18" charset="0"/>
-              </a:rPr>
-              <a:t>: </a:t>
-            </a:r>
-            <a:endParaRPr lang="en-US" altLang="zh-TW" b="1" dirty="0" smtClean="0">
-              <a:latin typeface="Times New Roman" panose="02020603050405020304" pitchFamily="18" charset="0"/>
-              <a:cs typeface="Times New Roman" panose="02020603050405020304" pitchFamily="18" charset="0"/>
-            </a:endParaRPr>
           </a:p>
           <a:p>
             <a:pPr lvl="1" algn="just"/>
@@ -21815,14 +21726,7 @@
                 <a:latin typeface="Times New Roman" panose="02020603050405020304" pitchFamily="18" charset="0"/>
                 <a:cs typeface="Times New Roman" panose="02020603050405020304" pitchFamily="18" charset="0"/>
               </a:rPr>
-              <a:t>    The core and transport networks ensure the transmission of communication traffic between MEC-hosted services and the previous Cloud-hosted services</a:t>
-            </a:r>
-            <a:r>
-              <a:rPr lang="en-US" altLang="zh-TW" dirty="0" smtClean="0">
-                <a:latin typeface="Times New Roman" panose="02020603050405020304" pitchFamily="18" charset="0"/>
-                <a:cs typeface="Times New Roman" panose="02020603050405020304" pitchFamily="18" charset="0"/>
-              </a:rPr>
-              <a:t>. Given that this communication belongs </a:t>
+              <a:t>    The core and transport networks ensure the transmission of communication traffic between MEC-hosted services and the previous Cloud-hosted services. Given that this communication belongs </a:t>
             </a:r>
             <a:r>
               <a:rPr lang="en-US" altLang="zh-TW" dirty="0">
@@ -22292,14 +22196,7 @@
                 <a:latin typeface="Times New Roman" panose="02020603050405020304" pitchFamily="18" charset="0"/>
                 <a:cs typeface="Times New Roman" panose="02020603050405020304" pitchFamily="18" charset="0"/>
               </a:rPr>
-              <a:t>    </a:t>
-            </a:r>
-            <a:r>
-              <a:rPr lang="en-US" altLang="zh-TW" dirty="0" smtClean="0">
-                <a:latin typeface="Times New Roman" panose="02020603050405020304" pitchFamily="18" charset="0"/>
-                <a:cs typeface="Times New Roman" panose="02020603050405020304" pitchFamily="18" charset="0"/>
-              </a:rPr>
-              <a:t>In this framework, MEC nodes are used to host UAVs Flight Controller service (UFC). The UFC is responsible for the monitoring and controlling the UAVs that connected to MEC nodes. Also, UFC collects information (i.e., geo-fences, weather forecasts and location of interest) and command from cloud-hosted services, and accordingly adapts UAVs’ flights.</a:t>
+              <a:t>    In this framework, MEC nodes are used to host UAVs Flight Controller service (UFC). The UFC is responsible for the monitoring and controlling the UAVs that connected to MEC nodes. Also, UFC collects information (i.e., geo-fences, weather forecasts and location of interest) and command from cloud-hosted services, and accordingly adapts UAVs’ flights.</a:t>
             </a:r>
             <a:endParaRPr lang="zh-TW" altLang="en-US" dirty="0">
               <a:latin typeface="Times New Roman" panose="02020603050405020304" pitchFamily="18" charset="0"/>
@@ -23700,8 +23597,8 @@
           </a:p>
         </p:txBody>
       </p:sp>
-      <mc:AlternateContent xmlns:mc="http://schemas.openxmlformats.org/markup-compatibility/2006">
-        <mc:Choice xmlns:a14="http://schemas.microsoft.com/office/drawing/2010/main" Requires="a14">
+      <mc:AlternateContent xmlns:mc="http://schemas.openxmlformats.org/markup-compatibility/2006" xmlns:a14="http://schemas.microsoft.com/office/drawing/2010/main">
+        <mc:Choice Requires="a14">
           <p:sp>
             <p:nvSpPr>
               <p:cNvPr id="10" name="文字方塊 9"/>
@@ -23789,7 +23686,7 @@
             </p:txBody>
           </p:sp>
         </mc:Choice>
-        <mc:Fallback>
+        <mc:Fallback xmlns="">
           <p:sp>
             <p:nvSpPr>
               <p:cNvPr id="10" name="文字方塊 9"/>

</xml_diff>